<commit_message>
if updates + libraries
</commit_message>
<xml_diff>
--- a/Python Lesson 6 While Loops [Autosaved].pptx
+++ b/Python Lesson 6 While Loops [Autosaved].pptx
@@ -5,7 +5,7 @@
     <p:sldMasterId id="2147483696" r:id="rId1"/>
   </p:sldMasterIdLst>
   <p:notesMasterIdLst>
-    <p:notesMasterId r:id="rId30"/>
+    <p:notesMasterId r:id="rId29"/>
   </p:notesMasterIdLst>
   <p:sldIdLst>
     <p:sldId id="256" r:id="rId2"/>
@@ -19,23 +19,22 @@
     <p:sldId id="263" r:id="rId10"/>
     <p:sldId id="282" r:id="rId11"/>
     <p:sldId id="290" r:id="rId12"/>
-    <p:sldId id="289" r:id="rId13"/>
-    <p:sldId id="265" r:id="rId14"/>
-    <p:sldId id="288" r:id="rId15"/>
-    <p:sldId id="264" r:id="rId16"/>
-    <p:sldId id="268" r:id="rId17"/>
-    <p:sldId id="269" r:id="rId18"/>
-    <p:sldId id="281" r:id="rId19"/>
-    <p:sldId id="275" r:id="rId20"/>
-    <p:sldId id="276" r:id="rId21"/>
-    <p:sldId id="277" r:id="rId22"/>
-    <p:sldId id="278" r:id="rId23"/>
-    <p:sldId id="280" r:id="rId24"/>
-    <p:sldId id="279" r:id="rId25"/>
-    <p:sldId id="270" r:id="rId26"/>
-    <p:sldId id="271" r:id="rId27"/>
-    <p:sldId id="272" r:id="rId28"/>
-    <p:sldId id="273" r:id="rId29"/>
+    <p:sldId id="265" r:id="rId13"/>
+    <p:sldId id="288" r:id="rId14"/>
+    <p:sldId id="264" r:id="rId15"/>
+    <p:sldId id="268" r:id="rId16"/>
+    <p:sldId id="269" r:id="rId17"/>
+    <p:sldId id="281" r:id="rId18"/>
+    <p:sldId id="275" r:id="rId19"/>
+    <p:sldId id="276" r:id="rId20"/>
+    <p:sldId id="277" r:id="rId21"/>
+    <p:sldId id="278" r:id="rId22"/>
+    <p:sldId id="280" r:id="rId23"/>
+    <p:sldId id="279" r:id="rId24"/>
+    <p:sldId id="270" r:id="rId25"/>
+    <p:sldId id="271" r:id="rId26"/>
+    <p:sldId id="272" r:id="rId27"/>
+    <p:sldId id="273" r:id="rId28"/>
   </p:sldIdLst>
   <p:sldSz cx="12192000" cy="6858000"/>
   <p:notesSz cx="6858000" cy="9144000"/>
@@ -224,7 +223,7 @@
           <a:p>
             <a:fld id="{6E488D89-E43B-4E30-86EA-3A041CF79CE3}" type="datetimeFigureOut">
               <a:rPr lang="en-US" smtClean="0"/>
-              <a:t>12/8/2018</a:t>
+              <a:t>2/8/2019</a:t>
             </a:fld>
             <a:endParaRPr lang="en-US"/>
           </a:p>
@@ -820,7 +819,7 @@
           <a:p>
             <a:fld id="{FA2C7687-E1CA-4716-AF29-39F13B8D7E13}" type="slidenum">
               <a:rPr lang="en-US" smtClean="0"/>
-              <a:t>15</a:t>
+              <a:t>14</a:t>
             </a:fld>
             <a:endParaRPr lang="en-US"/>
           </a:p>
@@ -1002,7 +1001,7 @@
           <a:p>
             <a:fld id="{1160EA64-D806-43AC-9DF2-F8C432F32B4C}" type="datetimeFigureOut">
               <a:rPr lang="en-US" dirty="0"/>
-              <a:t>12/8/2018</a:t>
+              <a:t>2/8/2019</a:t>
             </a:fld>
             <a:endParaRPr lang="en-US" dirty="0"/>
           </a:p>
@@ -1168,7 +1167,7 @@
           <a:p>
             <a:fld id="{E9F9C37B-1D36-470B-8223-D6C91242EC14}" type="datetimeFigureOut">
               <a:rPr lang="en-US" dirty="0"/>
-              <a:t>12/8/2018</a:t>
+              <a:t>2/8/2019</a:t>
             </a:fld>
             <a:endParaRPr lang="en-US" dirty="0"/>
           </a:p>
@@ -1343,7 +1342,7 @@
           <a:p>
             <a:fld id="{67C6F52A-A82B-47A2-A83A-8C4C91F2D59F}" type="datetimeFigureOut">
               <a:rPr lang="en-US" dirty="0"/>
-              <a:t>12/8/2018</a:t>
+              <a:t>2/8/2019</a:t>
             </a:fld>
             <a:endParaRPr lang="en-US" dirty="0"/>
           </a:p>
@@ -1508,7 +1507,7 @@
           <a:p>
             <a:fld id="{F070A7B3-6521-4DCA-87E5-044747A908C1}" type="datetimeFigureOut">
               <a:rPr lang="en-US" dirty="0"/>
-              <a:t>12/8/2018</a:t>
+              <a:t>2/8/2019</a:t>
             </a:fld>
             <a:endParaRPr lang="en-US" dirty="0"/>
           </a:p>
@@ -1772,7 +1771,7 @@
           <a:p>
             <a:fld id="{1160EA64-D806-43AC-9DF2-F8C432F32B4C}" type="datetimeFigureOut">
               <a:rPr lang="en-US" dirty="0"/>
-              <a:t>12/8/2018</a:t>
+              <a:t>2/8/2019</a:t>
             </a:fld>
             <a:endParaRPr lang="en-US" dirty="0"/>
           </a:p>
@@ -2000,7 +1999,7 @@
           <a:p>
             <a:fld id="{AB134690-1557-4C89-A502-4959FE7FAD70}" type="datetimeFigureOut">
               <a:rPr lang="en-US" dirty="0"/>
-              <a:t>12/8/2018</a:t>
+              <a:t>2/8/2019</a:t>
             </a:fld>
             <a:endParaRPr lang="en-US" dirty="0"/>
           </a:p>
@@ -2354,7 +2353,7 @@
           <a:p>
             <a:fld id="{4F7D4976-E339-4826-83B7-FBD03F55ECF8}" type="datetimeFigureOut">
               <a:rPr lang="en-US" dirty="0"/>
-              <a:t>12/8/2018</a:t>
+              <a:t>2/8/2019</a:t>
             </a:fld>
             <a:endParaRPr lang="en-US" dirty="0"/>
           </a:p>
@@ -2490,7 +2489,7 @@
           <a:p>
             <a:fld id="{E1037C31-9E7A-4F99-8774-A0E530DE1A42}" type="datetimeFigureOut">
               <a:rPr lang="en-US" dirty="0"/>
-              <a:t>12/8/2018</a:t>
+              <a:t>2/8/2019</a:t>
             </a:fld>
             <a:endParaRPr lang="en-US" dirty="0"/>
           </a:p>
@@ -2580,7 +2579,7 @@
           <a:p>
             <a:fld id="{C278504F-A551-4DE0-9316-4DCD1D8CC752}" type="datetimeFigureOut">
               <a:rPr lang="en-US" dirty="0"/>
-              <a:t>12/8/2018</a:t>
+              <a:t>2/8/2019</a:t>
             </a:fld>
             <a:endParaRPr lang="en-US" dirty="0"/>
           </a:p>
@@ -2932,7 +2931,7 @@
           <a:p>
             <a:fld id="{D1BE4249-C0D0-4B06-8692-E8BB871AF643}" type="datetimeFigureOut">
               <a:rPr lang="en-US" dirty="0"/>
-              <a:t>12/8/2018</a:t>
+              <a:t>2/8/2019</a:t>
             </a:fld>
             <a:endParaRPr lang="en-US" dirty="0"/>
           </a:p>
@@ -3284,7 +3283,7 @@
           <a:p>
             <a:fld id="{042B0DB6-F5C7-45FB-8CF3-31B45F9C2DAC}" type="datetimeFigureOut">
               <a:rPr lang="en-US" dirty="0"/>
-              <a:t>12/8/2018</a:t>
+              <a:t>2/8/2019</a:t>
             </a:fld>
             <a:endParaRPr lang="en-US" dirty="0"/>
           </a:p>
@@ -3520,7 +3519,7 @@
           <a:p>
             <a:fld id="{1160EA64-D806-43AC-9DF2-F8C432F32B4C}" type="datetimeFigureOut">
               <a:rPr lang="en-US" dirty="0"/>
-              <a:t>12/8/2018</a:t>
+              <a:t>2/8/2019</a:t>
             </a:fld>
             <a:endParaRPr lang="en-US" dirty="0"/>
           </a:p>
@@ -4706,161 +4705,6 @@
       </p:grpSpPr>
       <p:sp>
         <p:nvSpPr>
-          <p:cNvPr id="2" name="Text Placeholder 1">
-            <a:extLst>
-              <a:ext uri="{FF2B5EF4-FFF2-40B4-BE49-F238E27FC236}">
-                <a16:creationId xmlns:a16="http://schemas.microsoft.com/office/drawing/2014/main" id="{18BEE5CB-74BF-4EFA-B6AE-326E327E1525}"/>
-              </a:ext>
-            </a:extLst>
-          </p:cNvPr>
-          <p:cNvSpPr>
-            <a:spLocks noGrp="1"/>
-          </p:cNvSpPr>
-          <p:nvPr>
-            <p:ph type="body" idx="1"/>
-          </p:nvPr>
-        </p:nvSpPr>
-        <p:spPr/>
-        <p:txBody>
-          <a:bodyPr/>
-          <a:lstStyle/>
-          <a:p>
-            <a:endParaRPr lang="en-US"/>
-          </a:p>
-        </p:txBody>
-      </p:sp>
-      <p:sp>
-        <p:nvSpPr>
-          <p:cNvPr id="3" name="Content Placeholder 2">
-            <a:extLst>
-              <a:ext uri="{FF2B5EF4-FFF2-40B4-BE49-F238E27FC236}">
-                <a16:creationId xmlns:a16="http://schemas.microsoft.com/office/drawing/2014/main" id="{3DB1BBE6-62C3-4E77-8C43-EAAED089CD58}"/>
-              </a:ext>
-            </a:extLst>
-          </p:cNvPr>
-          <p:cNvSpPr>
-            <a:spLocks noGrp="1"/>
-          </p:cNvSpPr>
-          <p:nvPr>
-            <p:ph sz="half" idx="2"/>
-          </p:nvPr>
-        </p:nvSpPr>
-        <p:spPr/>
-        <p:txBody>
-          <a:bodyPr/>
-          <a:lstStyle/>
-          <a:p>
-            <a:endParaRPr lang="en-US"/>
-          </a:p>
-        </p:txBody>
-      </p:sp>
-      <p:sp>
-        <p:nvSpPr>
-          <p:cNvPr id="4" name="Content Placeholder 3">
-            <a:extLst>
-              <a:ext uri="{FF2B5EF4-FFF2-40B4-BE49-F238E27FC236}">
-                <a16:creationId xmlns:a16="http://schemas.microsoft.com/office/drawing/2014/main" id="{EA8A3F3B-2F29-4976-BAC5-6252298DE142}"/>
-              </a:ext>
-            </a:extLst>
-          </p:cNvPr>
-          <p:cNvSpPr>
-            <a:spLocks noGrp="1"/>
-          </p:cNvSpPr>
-          <p:nvPr>
-            <p:ph sz="quarter" idx="4"/>
-          </p:nvPr>
-        </p:nvSpPr>
-        <p:spPr/>
-        <p:txBody>
-          <a:bodyPr/>
-          <a:lstStyle/>
-          <a:p>
-            <a:endParaRPr lang="en-US"/>
-          </a:p>
-        </p:txBody>
-      </p:sp>
-      <p:sp>
-        <p:nvSpPr>
-          <p:cNvPr id="5" name="Text Placeholder 4">
-            <a:extLst>
-              <a:ext uri="{FF2B5EF4-FFF2-40B4-BE49-F238E27FC236}">
-                <a16:creationId xmlns:a16="http://schemas.microsoft.com/office/drawing/2014/main" id="{FAB5A4DE-247D-4126-824B-4AB9C47DA0AC}"/>
-              </a:ext>
-            </a:extLst>
-          </p:cNvPr>
-          <p:cNvSpPr>
-            <a:spLocks noGrp="1"/>
-          </p:cNvSpPr>
-          <p:nvPr>
-            <p:ph type="body" sz="quarter" idx="13"/>
-          </p:nvPr>
-        </p:nvSpPr>
-        <p:spPr/>
-        <p:txBody>
-          <a:bodyPr/>
-          <a:lstStyle/>
-          <a:p>
-            <a:endParaRPr lang="en-US"/>
-          </a:p>
-        </p:txBody>
-      </p:sp>
-      <p:sp>
-        <p:nvSpPr>
-          <p:cNvPr id="6" name="Title 5">
-            <a:extLst>
-              <a:ext uri="{FF2B5EF4-FFF2-40B4-BE49-F238E27FC236}">
-                <a16:creationId xmlns:a16="http://schemas.microsoft.com/office/drawing/2014/main" id="{B6DA25F5-B52C-4E9D-BF37-0B71ED401B7A}"/>
-              </a:ext>
-            </a:extLst>
-          </p:cNvPr>
-          <p:cNvSpPr>
-            <a:spLocks noGrp="1"/>
-          </p:cNvSpPr>
-          <p:nvPr>
-            <p:ph type="title"/>
-          </p:nvPr>
-        </p:nvSpPr>
-        <p:spPr/>
-        <p:txBody>
-          <a:bodyPr/>
-          <a:lstStyle/>
-          <a:p>
-            <a:endParaRPr lang="en-US"/>
-          </a:p>
-        </p:txBody>
-      </p:sp>
-    </p:spTree>
-    <p:extLst>
-      <p:ext uri="{BB962C8B-B14F-4D97-AF65-F5344CB8AC3E}">
-        <p14:creationId xmlns:p14="http://schemas.microsoft.com/office/powerpoint/2010/main" val="3133301395"/>
-      </p:ext>
-    </p:extLst>
-  </p:cSld>
-  <p:clrMapOvr>
-    <a:masterClrMapping/>
-  </p:clrMapOvr>
-</p:sld>
-</file>
-
-<file path=ppt/slides/slide13.xml><?xml version="1.0" encoding="utf-8"?>
-<p:sld xmlns:a="http://schemas.openxmlformats.org/drawingml/2006/main" xmlns:r="http://schemas.openxmlformats.org/officeDocument/2006/relationships" xmlns:p="http://schemas.openxmlformats.org/presentationml/2006/main">
-  <p:cSld>
-    <p:spTree>
-      <p:nvGrpSpPr>
-        <p:cNvPr id="1" name=""/>
-        <p:cNvGrpSpPr/>
-        <p:nvPr/>
-      </p:nvGrpSpPr>
-      <p:grpSpPr>
-        <a:xfrm>
-          <a:off x="0" y="0"/>
-          <a:ext cx="0" cy="0"/>
-          <a:chOff x="0" y="0"/>
-          <a:chExt cx="0" cy="0"/>
-        </a:xfrm>
-      </p:grpSpPr>
-      <p:sp>
-        <p:nvSpPr>
           <p:cNvPr id="2" name="Title 1">
             <a:extLst>
               <a:ext uri="{FF2B5EF4-FFF2-40B4-BE49-F238E27FC236}">
@@ -5023,7 +4867,7 @@
 </p:sld>
 </file>
 
-<file path=ppt/slides/slide14.xml><?xml version="1.0" encoding="utf-8"?>
+<file path=ppt/slides/slide13.xml><?xml version="1.0" encoding="utf-8"?>
 <p:sld xmlns:a="http://schemas.openxmlformats.org/drawingml/2006/main" xmlns:r="http://schemas.openxmlformats.org/officeDocument/2006/relationships" xmlns:p="http://schemas.openxmlformats.org/presentationml/2006/main">
   <p:cSld>
     <p:spTree>
@@ -5432,7 +5276,7 @@
 </p:sld>
 </file>
 
-<file path=ppt/slides/slide15.xml><?xml version="1.0" encoding="utf-8"?>
+<file path=ppt/slides/slide14.xml><?xml version="1.0" encoding="utf-8"?>
 <p:sld xmlns:a="http://schemas.openxmlformats.org/drawingml/2006/main" xmlns:r="http://schemas.openxmlformats.org/officeDocument/2006/relationships" xmlns:p="http://schemas.openxmlformats.org/presentationml/2006/main">
   <p:cSld>
     <p:bg>
@@ -5654,7 +5498,7 @@
 </p:sld>
 </file>
 
-<file path=ppt/slides/slide16.xml><?xml version="1.0" encoding="utf-8"?>
+<file path=ppt/slides/slide15.xml><?xml version="1.0" encoding="utf-8"?>
 <p:sld xmlns:a="http://schemas.openxmlformats.org/drawingml/2006/main" xmlns:r="http://schemas.openxmlformats.org/officeDocument/2006/relationships" xmlns:p="http://schemas.openxmlformats.org/presentationml/2006/main">
   <p:cSld>
     <p:spTree>
@@ -5818,7 +5662,7 @@
 </p:sld>
 </file>
 
-<file path=ppt/slides/slide17.xml><?xml version="1.0" encoding="utf-8"?>
+<file path=ppt/slides/slide16.xml><?xml version="1.0" encoding="utf-8"?>
 <p:sld xmlns:a="http://schemas.openxmlformats.org/drawingml/2006/main" xmlns:r="http://schemas.openxmlformats.org/officeDocument/2006/relationships" xmlns:p="http://schemas.openxmlformats.org/presentationml/2006/main">
   <p:cSld>
     <p:bg>
@@ -6041,6 +5885,112 @@
 </p:sld>
 </file>
 
+<file path=ppt/slides/slide17.xml><?xml version="1.0" encoding="utf-8"?>
+<p:sld xmlns:a="http://schemas.openxmlformats.org/drawingml/2006/main" xmlns:r="http://schemas.openxmlformats.org/officeDocument/2006/relationships" xmlns:p="http://schemas.openxmlformats.org/presentationml/2006/main">
+  <p:cSld>
+    <p:spTree>
+      <p:nvGrpSpPr>
+        <p:cNvPr id="1" name=""/>
+        <p:cNvGrpSpPr/>
+        <p:nvPr/>
+      </p:nvGrpSpPr>
+      <p:grpSpPr>
+        <a:xfrm>
+          <a:off x="0" y="0"/>
+          <a:ext cx="0" cy="0"/>
+          <a:chOff x="0" y="0"/>
+          <a:chExt cx="0" cy="0"/>
+        </a:xfrm>
+      </p:grpSpPr>
+      <p:sp>
+        <p:nvSpPr>
+          <p:cNvPr id="2" name="Title 1">
+            <a:extLst>
+              <a:ext uri="{FF2B5EF4-FFF2-40B4-BE49-F238E27FC236}">
+                <a16:creationId xmlns:a16="http://schemas.microsoft.com/office/drawing/2014/main" id="{02E47EC5-9C2C-45FD-8B1A-2D15724F9C21}"/>
+              </a:ext>
+            </a:extLst>
+          </p:cNvPr>
+          <p:cNvSpPr>
+            <a:spLocks noGrp="1"/>
+          </p:cNvSpPr>
+          <p:nvPr>
+            <p:ph type="title"/>
+          </p:nvPr>
+        </p:nvSpPr>
+        <p:spPr/>
+        <p:txBody>
+          <a:bodyPr/>
+          <a:lstStyle/>
+          <a:p>
+            <a:r>
+              <a:rPr lang="en-US" dirty="0"/>
+              <a:t>Non-counting loops</a:t>
+            </a:r>
+          </a:p>
+        </p:txBody>
+      </p:sp>
+      <p:sp>
+        <p:nvSpPr>
+          <p:cNvPr id="3" name="Content Placeholder 2">
+            <a:extLst>
+              <a:ext uri="{FF2B5EF4-FFF2-40B4-BE49-F238E27FC236}">
+                <a16:creationId xmlns:a16="http://schemas.microsoft.com/office/drawing/2014/main" id="{FB0CF578-ED22-4FF6-A29D-42F74380C691}"/>
+              </a:ext>
+            </a:extLst>
+          </p:cNvPr>
+          <p:cNvSpPr>
+            <a:spLocks noGrp="1"/>
+          </p:cNvSpPr>
+          <p:nvPr>
+            <p:ph idx="1"/>
+          </p:nvPr>
+        </p:nvSpPr>
+        <p:spPr/>
+        <p:txBody>
+          <a:bodyPr/>
+          <a:lstStyle/>
+          <a:p>
+            <a:r>
+              <a:rPr lang="en-US" dirty="0"/>
+              <a:t>So far, the loops we’ve seen execute based on a count. They repeat until we’ve executed the loop a certain number of times.</a:t>
+            </a:r>
+          </a:p>
+          <a:p>
+            <a:r>
+              <a:rPr lang="en-US" dirty="0"/>
+              <a:t>While loops are particularly useful when you don’t know how many times you need to execute the loop</a:t>
+            </a:r>
+          </a:p>
+          <a:p>
+            <a:pPr lvl="1"/>
+            <a:r>
+              <a:rPr lang="en-US" dirty="0"/>
+              <a:t>Loop until reaching a particular value (“sentinel”)</a:t>
+            </a:r>
+          </a:p>
+          <a:p>
+            <a:pPr lvl="1"/>
+            <a:r>
+              <a:rPr lang="en-US" dirty="0"/>
+              <a:t>Loop until a final state is achieved (“flag”)</a:t>
+            </a:r>
+          </a:p>
+        </p:txBody>
+      </p:sp>
+    </p:spTree>
+    <p:extLst>
+      <p:ext uri="{BB962C8B-B14F-4D97-AF65-F5344CB8AC3E}">
+        <p14:creationId xmlns:p14="http://schemas.microsoft.com/office/powerpoint/2010/main" val="1677722654"/>
+      </p:ext>
+    </p:extLst>
+  </p:cSld>
+  <p:clrMapOvr>
+    <a:masterClrMapping/>
+  </p:clrMapOvr>
+</p:sld>
+</file>
+
 <file path=ppt/slides/slide18.xml><?xml version="1.0" encoding="utf-8"?>
 <p:sld xmlns:a="http://schemas.openxmlformats.org/drawingml/2006/main" xmlns:r="http://schemas.openxmlformats.org/officeDocument/2006/relationships" xmlns:p="http://schemas.openxmlformats.org/presentationml/2006/main">
   <p:cSld>
@@ -6063,112 +6013,6 @@
           <p:cNvPr id="2" name="Title 1">
             <a:extLst>
               <a:ext uri="{FF2B5EF4-FFF2-40B4-BE49-F238E27FC236}">
-                <a16:creationId xmlns:a16="http://schemas.microsoft.com/office/drawing/2014/main" id="{02E47EC5-9C2C-45FD-8B1A-2D15724F9C21}"/>
-              </a:ext>
-            </a:extLst>
-          </p:cNvPr>
-          <p:cNvSpPr>
-            <a:spLocks noGrp="1"/>
-          </p:cNvSpPr>
-          <p:nvPr>
-            <p:ph type="title"/>
-          </p:nvPr>
-        </p:nvSpPr>
-        <p:spPr/>
-        <p:txBody>
-          <a:bodyPr/>
-          <a:lstStyle/>
-          <a:p>
-            <a:r>
-              <a:rPr lang="en-US" dirty="0"/>
-              <a:t>Non-counting loops</a:t>
-            </a:r>
-          </a:p>
-        </p:txBody>
-      </p:sp>
-      <p:sp>
-        <p:nvSpPr>
-          <p:cNvPr id="3" name="Content Placeholder 2">
-            <a:extLst>
-              <a:ext uri="{FF2B5EF4-FFF2-40B4-BE49-F238E27FC236}">
-                <a16:creationId xmlns:a16="http://schemas.microsoft.com/office/drawing/2014/main" id="{FB0CF578-ED22-4FF6-A29D-42F74380C691}"/>
-              </a:ext>
-            </a:extLst>
-          </p:cNvPr>
-          <p:cNvSpPr>
-            <a:spLocks noGrp="1"/>
-          </p:cNvSpPr>
-          <p:nvPr>
-            <p:ph idx="1"/>
-          </p:nvPr>
-        </p:nvSpPr>
-        <p:spPr/>
-        <p:txBody>
-          <a:bodyPr/>
-          <a:lstStyle/>
-          <a:p>
-            <a:r>
-              <a:rPr lang="en-US" dirty="0"/>
-              <a:t>So far, the loops we’ve seen execute based on a count. They repeat until we’ve executed the loop a certain number of times.</a:t>
-            </a:r>
-          </a:p>
-          <a:p>
-            <a:r>
-              <a:rPr lang="en-US" dirty="0"/>
-              <a:t>While loops are particularly useful when you don’t know how many times you need to execute the loop</a:t>
-            </a:r>
-          </a:p>
-          <a:p>
-            <a:pPr lvl="1"/>
-            <a:r>
-              <a:rPr lang="en-US" dirty="0"/>
-              <a:t>Loop until reaching a particular value (“sentinel”)</a:t>
-            </a:r>
-          </a:p>
-          <a:p>
-            <a:pPr lvl="1"/>
-            <a:r>
-              <a:rPr lang="en-US" dirty="0"/>
-              <a:t>Loop until a final state is achieved (“flag”)</a:t>
-            </a:r>
-          </a:p>
-        </p:txBody>
-      </p:sp>
-    </p:spTree>
-    <p:extLst>
-      <p:ext uri="{BB962C8B-B14F-4D97-AF65-F5344CB8AC3E}">
-        <p14:creationId xmlns:p14="http://schemas.microsoft.com/office/powerpoint/2010/main" val="1677722654"/>
-      </p:ext>
-    </p:extLst>
-  </p:cSld>
-  <p:clrMapOvr>
-    <a:masterClrMapping/>
-  </p:clrMapOvr>
-</p:sld>
-</file>
-
-<file path=ppt/slides/slide19.xml><?xml version="1.0" encoding="utf-8"?>
-<p:sld xmlns:a="http://schemas.openxmlformats.org/drawingml/2006/main" xmlns:r="http://schemas.openxmlformats.org/officeDocument/2006/relationships" xmlns:p="http://schemas.openxmlformats.org/presentationml/2006/main">
-  <p:cSld>
-    <p:spTree>
-      <p:nvGrpSpPr>
-        <p:cNvPr id="1" name=""/>
-        <p:cNvGrpSpPr/>
-        <p:nvPr/>
-      </p:nvGrpSpPr>
-      <p:grpSpPr>
-        <a:xfrm>
-          <a:off x="0" y="0"/>
-          <a:ext cx="0" cy="0"/>
-          <a:chOff x="0" y="0"/>
-          <a:chExt cx="0" cy="0"/>
-        </a:xfrm>
-      </p:grpSpPr>
-      <p:sp>
-        <p:nvSpPr>
-          <p:cNvPr id="2" name="Title 1">
-            <a:extLst>
-              <a:ext uri="{FF2B5EF4-FFF2-40B4-BE49-F238E27FC236}">
                 <a16:creationId xmlns:a16="http://schemas.microsoft.com/office/drawing/2014/main" id="{D0A9572D-E36A-4D5C-9D68-F03C20CE12FE}"/>
               </a:ext>
             </a:extLst>
@@ -6242,129 +6086,7 @@
 </p:sld>
 </file>
 
-<file path=ppt/slides/slide2.xml><?xml version="1.0" encoding="utf-8"?>
-<p:sld xmlns:a="http://schemas.openxmlformats.org/drawingml/2006/main" xmlns:r="http://schemas.openxmlformats.org/officeDocument/2006/relationships" xmlns:p="http://schemas.openxmlformats.org/presentationml/2006/main">
-  <p:cSld>
-    <p:spTree>
-      <p:nvGrpSpPr>
-        <p:cNvPr id="1" name=""/>
-        <p:cNvGrpSpPr/>
-        <p:nvPr/>
-      </p:nvGrpSpPr>
-      <p:grpSpPr>
-        <a:xfrm>
-          <a:off x="0" y="0"/>
-          <a:ext cx="0" cy="0"/>
-          <a:chOff x="0" y="0"/>
-          <a:chExt cx="0" cy="0"/>
-        </a:xfrm>
-      </p:grpSpPr>
-      <p:sp>
-        <p:nvSpPr>
-          <p:cNvPr id="2" name="Title 1">
-            <a:extLst>
-              <a:ext uri="{FF2B5EF4-FFF2-40B4-BE49-F238E27FC236}">
-                <a16:creationId xmlns:a16="http://schemas.microsoft.com/office/drawing/2014/main" id="{0C9DAE7E-37DE-4C5D-908F-55B8D87F3B2E}"/>
-              </a:ext>
-            </a:extLst>
-          </p:cNvPr>
-          <p:cNvSpPr>
-            <a:spLocks noGrp="1"/>
-          </p:cNvSpPr>
-          <p:nvPr>
-            <p:ph type="title"/>
-          </p:nvPr>
-        </p:nvSpPr>
-        <p:spPr/>
-        <p:txBody>
-          <a:bodyPr/>
-          <a:lstStyle/>
-          <a:p>
-            <a:r>
-              <a:rPr lang="en-US" dirty="0"/>
-              <a:t>If Review</a:t>
-            </a:r>
-          </a:p>
-        </p:txBody>
-      </p:sp>
-      <p:sp>
-        <p:nvSpPr>
-          <p:cNvPr id="3" name="Content Placeholder 2">
-            <a:extLst>
-              <a:ext uri="{FF2B5EF4-FFF2-40B4-BE49-F238E27FC236}">
-                <a16:creationId xmlns:a16="http://schemas.microsoft.com/office/drawing/2014/main" id="{CA01F07D-FD15-486E-9BAC-F39579B06C00}"/>
-              </a:ext>
-            </a:extLst>
-          </p:cNvPr>
-          <p:cNvSpPr>
-            <a:spLocks noGrp="1"/>
-          </p:cNvSpPr>
-          <p:nvPr>
-            <p:ph idx="1"/>
-          </p:nvPr>
-        </p:nvSpPr>
-        <p:spPr/>
-        <p:txBody>
-          <a:bodyPr/>
-          <a:lstStyle/>
-          <a:p>
-            <a:r>
-              <a:rPr lang="en-US" dirty="0"/>
-              <a:t>If-statements evaluate a “Boolean” condition</a:t>
-            </a:r>
-          </a:p>
-          <a:p>
-            <a:pPr lvl="1"/>
-            <a:r>
-              <a:rPr lang="en-US" dirty="0"/>
-              <a:t>Boolean condition – evaluates to True or False</a:t>
-            </a:r>
-          </a:p>
-          <a:p>
-            <a:r>
-              <a:rPr lang="en-US" dirty="0"/>
-              <a:t>If the condition is true, the code inside the if-statement will execute</a:t>
-            </a:r>
-          </a:p>
-          <a:p>
-            <a:pPr lvl="1"/>
-            <a:r>
-              <a:rPr lang="en-US" dirty="0"/>
-              <a:t>Use indentation to indicate what code is controlled by the if-statement</a:t>
-            </a:r>
-          </a:p>
-          <a:p>
-            <a:r>
-              <a:rPr lang="en-US" dirty="0"/>
-              <a:t>So far our code executes top to bottom and never goes back up</a:t>
-            </a:r>
-          </a:p>
-          <a:p>
-            <a:pPr lvl="1"/>
-            <a:r>
-              <a:rPr lang="en-US" dirty="0"/>
-              <a:t>Loops let us go back up and repeat code</a:t>
-            </a:r>
-          </a:p>
-          <a:p>
-            <a:endParaRPr lang="en-US" dirty="0"/>
-          </a:p>
-        </p:txBody>
-      </p:sp>
-    </p:spTree>
-    <p:extLst>
-      <p:ext uri="{BB962C8B-B14F-4D97-AF65-F5344CB8AC3E}">
-        <p14:creationId xmlns:p14="http://schemas.microsoft.com/office/powerpoint/2010/main" val="2673233627"/>
-      </p:ext>
-    </p:extLst>
-  </p:cSld>
-  <p:clrMapOvr>
-    <a:masterClrMapping/>
-  </p:clrMapOvr>
-</p:sld>
-</file>
-
-<file path=ppt/slides/slide20.xml><?xml version="1.0" encoding="utf-8"?>
+<file path=ppt/slides/slide19.xml><?xml version="1.0" encoding="utf-8"?>
 <p:sld xmlns:a="http://schemas.openxmlformats.org/drawingml/2006/main" xmlns:r="http://schemas.openxmlformats.org/officeDocument/2006/relationships" xmlns:p="http://schemas.openxmlformats.org/presentationml/2006/main">
   <p:cSld>
     <p:spTree>
@@ -6649,7 +6371,129 @@
 </p:sld>
 </file>
 
-<file path=ppt/slides/slide21.xml><?xml version="1.0" encoding="utf-8"?>
+<file path=ppt/slides/slide2.xml><?xml version="1.0" encoding="utf-8"?>
+<p:sld xmlns:a="http://schemas.openxmlformats.org/drawingml/2006/main" xmlns:r="http://schemas.openxmlformats.org/officeDocument/2006/relationships" xmlns:p="http://schemas.openxmlformats.org/presentationml/2006/main">
+  <p:cSld>
+    <p:spTree>
+      <p:nvGrpSpPr>
+        <p:cNvPr id="1" name=""/>
+        <p:cNvGrpSpPr/>
+        <p:nvPr/>
+      </p:nvGrpSpPr>
+      <p:grpSpPr>
+        <a:xfrm>
+          <a:off x="0" y="0"/>
+          <a:ext cx="0" cy="0"/>
+          <a:chOff x="0" y="0"/>
+          <a:chExt cx="0" cy="0"/>
+        </a:xfrm>
+      </p:grpSpPr>
+      <p:sp>
+        <p:nvSpPr>
+          <p:cNvPr id="2" name="Title 1">
+            <a:extLst>
+              <a:ext uri="{FF2B5EF4-FFF2-40B4-BE49-F238E27FC236}">
+                <a16:creationId xmlns:a16="http://schemas.microsoft.com/office/drawing/2014/main" id="{0C9DAE7E-37DE-4C5D-908F-55B8D87F3B2E}"/>
+              </a:ext>
+            </a:extLst>
+          </p:cNvPr>
+          <p:cNvSpPr>
+            <a:spLocks noGrp="1"/>
+          </p:cNvSpPr>
+          <p:nvPr>
+            <p:ph type="title"/>
+          </p:nvPr>
+        </p:nvSpPr>
+        <p:spPr/>
+        <p:txBody>
+          <a:bodyPr/>
+          <a:lstStyle/>
+          <a:p>
+            <a:r>
+              <a:rPr lang="en-US" dirty="0"/>
+              <a:t>If Review</a:t>
+            </a:r>
+          </a:p>
+        </p:txBody>
+      </p:sp>
+      <p:sp>
+        <p:nvSpPr>
+          <p:cNvPr id="3" name="Content Placeholder 2">
+            <a:extLst>
+              <a:ext uri="{FF2B5EF4-FFF2-40B4-BE49-F238E27FC236}">
+                <a16:creationId xmlns:a16="http://schemas.microsoft.com/office/drawing/2014/main" id="{CA01F07D-FD15-486E-9BAC-F39579B06C00}"/>
+              </a:ext>
+            </a:extLst>
+          </p:cNvPr>
+          <p:cNvSpPr>
+            <a:spLocks noGrp="1"/>
+          </p:cNvSpPr>
+          <p:nvPr>
+            <p:ph idx="1"/>
+          </p:nvPr>
+        </p:nvSpPr>
+        <p:spPr/>
+        <p:txBody>
+          <a:bodyPr/>
+          <a:lstStyle/>
+          <a:p>
+            <a:r>
+              <a:rPr lang="en-US" dirty="0"/>
+              <a:t>If-statements evaluate a “Boolean” condition</a:t>
+            </a:r>
+          </a:p>
+          <a:p>
+            <a:pPr lvl="1"/>
+            <a:r>
+              <a:rPr lang="en-US" dirty="0"/>
+              <a:t>Boolean condition – evaluates to True or False</a:t>
+            </a:r>
+          </a:p>
+          <a:p>
+            <a:r>
+              <a:rPr lang="en-US" dirty="0"/>
+              <a:t>If the condition is true, the code inside the if-statement will execute</a:t>
+            </a:r>
+          </a:p>
+          <a:p>
+            <a:pPr lvl="1"/>
+            <a:r>
+              <a:rPr lang="en-US" dirty="0"/>
+              <a:t>Use indentation to indicate what code is controlled by the if-statement</a:t>
+            </a:r>
+          </a:p>
+          <a:p>
+            <a:r>
+              <a:rPr lang="en-US" dirty="0"/>
+              <a:t>So far our code executes top to bottom and never goes back up</a:t>
+            </a:r>
+          </a:p>
+          <a:p>
+            <a:pPr lvl="1"/>
+            <a:r>
+              <a:rPr lang="en-US" dirty="0"/>
+              <a:t>Loops let us go back up and repeat code</a:t>
+            </a:r>
+          </a:p>
+          <a:p>
+            <a:endParaRPr lang="en-US" dirty="0"/>
+          </a:p>
+        </p:txBody>
+      </p:sp>
+    </p:spTree>
+    <p:extLst>
+      <p:ext uri="{BB962C8B-B14F-4D97-AF65-F5344CB8AC3E}">
+        <p14:creationId xmlns:p14="http://schemas.microsoft.com/office/powerpoint/2010/main" val="2673233627"/>
+      </p:ext>
+    </p:extLst>
+  </p:cSld>
+  <p:clrMapOvr>
+    <a:masterClrMapping/>
+  </p:clrMapOvr>
+</p:sld>
+</file>
+
+<file path=ppt/slides/slide20.xml><?xml version="1.0" encoding="utf-8"?>
 <p:sld xmlns:a="http://schemas.openxmlformats.org/drawingml/2006/main" xmlns:r="http://schemas.openxmlformats.org/officeDocument/2006/relationships" xmlns:p="http://schemas.openxmlformats.org/presentationml/2006/main">
   <p:cSld>
     <p:bg>
@@ -6842,7 +6686,7 @@
 </p:sld>
 </file>
 
-<file path=ppt/slides/slide22.xml><?xml version="1.0" encoding="utf-8"?>
+<file path=ppt/slides/slide21.xml><?xml version="1.0" encoding="utf-8"?>
 <p:sld xmlns:a="http://schemas.openxmlformats.org/drawingml/2006/main" xmlns:r="http://schemas.openxmlformats.org/officeDocument/2006/relationships" xmlns:p="http://schemas.openxmlformats.org/presentationml/2006/main">
   <p:cSld>
     <p:spTree>
@@ -7120,7 +6964,7 @@
 </p:sld>
 </file>
 
-<file path=ppt/slides/slide23.xml><?xml version="1.0" encoding="utf-8"?>
+<file path=ppt/slides/slide22.xml><?xml version="1.0" encoding="utf-8"?>
 <p:sld xmlns:a="http://schemas.openxmlformats.org/drawingml/2006/main" xmlns:r="http://schemas.openxmlformats.org/officeDocument/2006/relationships" xmlns:p="http://schemas.openxmlformats.org/presentationml/2006/main">
   <p:cSld>
     <p:spTree>
@@ -7350,7 +7194,7 @@
 </p:sld>
 </file>
 
-<file path=ppt/slides/slide24.xml><?xml version="1.0" encoding="utf-8"?>
+<file path=ppt/slides/slide23.xml><?xml version="1.0" encoding="utf-8"?>
 <p:sld xmlns:a="http://schemas.openxmlformats.org/drawingml/2006/main" xmlns:r="http://schemas.openxmlformats.org/officeDocument/2006/relationships" xmlns:p="http://schemas.openxmlformats.org/presentationml/2006/main">
   <p:cSld>
     <p:bg>
@@ -7543,6 +7387,115 @@
 </p:sld>
 </file>
 
+<file path=ppt/slides/slide24.xml><?xml version="1.0" encoding="utf-8"?>
+<p:sld xmlns:a="http://schemas.openxmlformats.org/drawingml/2006/main" xmlns:r="http://schemas.openxmlformats.org/officeDocument/2006/relationships" xmlns:p="http://schemas.openxmlformats.org/presentationml/2006/main">
+  <p:cSld>
+    <p:spTree>
+      <p:nvGrpSpPr>
+        <p:cNvPr id="1" name=""/>
+        <p:cNvGrpSpPr/>
+        <p:nvPr/>
+      </p:nvGrpSpPr>
+      <p:grpSpPr>
+        <a:xfrm>
+          <a:off x="0" y="0"/>
+          <a:ext cx="0" cy="0"/>
+          <a:chOff x="0" y="0"/>
+          <a:chExt cx="0" cy="0"/>
+        </a:xfrm>
+      </p:grpSpPr>
+      <p:sp>
+        <p:nvSpPr>
+          <p:cNvPr id="2" name="Title 1">
+            <a:extLst>
+              <a:ext uri="{FF2B5EF4-FFF2-40B4-BE49-F238E27FC236}">
+                <a16:creationId xmlns:a16="http://schemas.microsoft.com/office/drawing/2014/main" id="{8621EB94-5B22-4940-BAFB-EFB522742991}"/>
+              </a:ext>
+            </a:extLst>
+          </p:cNvPr>
+          <p:cNvSpPr>
+            <a:spLocks noGrp="1"/>
+          </p:cNvSpPr>
+          <p:nvPr>
+            <p:ph type="title"/>
+          </p:nvPr>
+        </p:nvSpPr>
+        <p:spPr/>
+        <p:txBody>
+          <a:bodyPr/>
+          <a:lstStyle/>
+          <a:p>
+            <a:r>
+              <a:rPr lang="en-US" dirty="0"/>
+              <a:t>Hints for Problems</a:t>
+            </a:r>
+          </a:p>
+        </p:txBody>
+      </p:sp>
+      <p:sp>
+        <p:nvSpPr>
+          <p:cNvPr id="3" name="Content Placeholder 2">
+            <a:extLst>
+              <a:ext uri="{FF2B5EF4-FFF2-40B4-BE49-F238E27FC236}">
+                <a16:creationId xmlns:a16="http://schemas.microsoft.com/office/drawing/2014/main" id="{A0ADBA72-396B-45D0-94D0-3978BCDA47A2}"/>
+              </a:ext>
+            </a:extLst>
+          </p:cNvPr>
+          <p:cNvSpPr>
+            <a:spLocks noGrp="1"/>
+          </p:cNvSpPr>
+          <p:nvPr>
+            <p:ph idx="1"/>
+          </p:nvPr>
+        </p:nvSpPr>
+        <p:spPr/>
+        <p:txBody>
+          <a:bodyPr/>
+          <a:lstStyle/>
+          <a:p>
+            <a:r>
+              <a:rPr lang="en-US" dirty="0"/>
+              <a:t>In the above examples, we changed our variable that controls the loop by one (e.g. count = count + </a:t>
+            </a:r>
+            <a:r>
+              <a:rPr lang="en-US" dirty="0">
+                <a:latin typeface="Arial" panose="020B0604020202020204" pitchFamily="34" charset="0"/>
+                <a:cs typeface="Arial" panose="020B0604020202020204" pitchFamily="34" charset="0"/>
+              </a:rPr>
+              <a:t>1</a:t>
+            </a:r>
+            <a:r>
+              <a:rPr lang="en-US" dirty="0"/>
+              <a:t>)</a:t>
+            </a:r>
+          </a:p>
+          <a:p>
+            <a:r>
+              <a:rPr lang="en-US" dirty="0"/>
+              <a:t>However, you can change that variable by any amount, including subtracting from it.</a:t>
+            </a:r>
+          </a:p>
+          <a:p>
+            <a:r>
+              <a:rPr lang="en-US" dirty="0"/>
+              <a:t>Recall “modulus.” Mod is the remainder when you divide 2 numbers. If the number divide evenly, then the mod of the 2 numbers (remainder) is 0.</a:t>
+            </a:r>
+          </a:p>
+        </p:txBody>
+      </p:sp>
+    </p:spTree>
+    <p:extLst>
+      <p:ext uri="{BB962C8B-B14F-4D97-AF65-F5344CB8AC3E}">
+        <p14:creationId xmlns:p14="http://schemas.microsoft.com/office/powerpoint/2010/main" val="2025216280"/>
+      </p:ext>
+    </p:extLst>
+  </p:cSld>
+  <p:clrMapOvr>
+    <a:masterClrMapping/>
+  </p:clrMapOvr>
+</p:sld>
+</file>
+
 <file path=ppt/slides/slide25.xml><?xml version="1.0" encoding="utf-8"?>
 <p:sld xmlns:a="http://schemas.openxmlformats.org/drawingml/2006/main" xmlns:r="http://schemas.openxmlformats.org/officeDocument/2006/relationships" xmlns:p="http://schemas.openxmlformats.org/presentationml/2006/main">
   <p:cSld>
@@ -7565,7 +7518,7 @@
           <p:cNvPr id="2" name="Title 1">
             <a:extLst>
               <a:ext uri="{FF2B5EF4-FFF2-40B4-BE49-F238E27FC236}">
-                <a16:creationId xmlns:a16="http://schemas.microsoft.com/office/drawing/2014/main" id="{8621EB94-5B22-4940-BAFB-EFB522742991}"/>
+                <a16:creationId xmlns:a16="http://schemas.microsoft.com/office/drawing/2014/main" id="{E6AA549E-CEB9-4612-84DC-E44A7C2C8AD1}"/>
               </a:ext>
             </a:extLst>
           </p:cNvPr>
@@ -7583,7 +7536,7 @@
           <a:p>
             <a:r>
               <a:rPr lang="en-US" dirty="0"/>
-              <a:t>Hints for Problems</a:t>
+              <a:t>KEY POINTs</a:t>
             </a:r>
           </a:p>
         </p:txBody>
@@ -7593,7 +7546,7 @@
           <p:cNvPr id="3" name="Content Placeholder 2">
             <a:extLst>
               <a:ext uri="{FF2B5EF4-FFF2-40B4-BE49-F238E27FC236}">
-                <a16:creationId xmlns:a16="http://schemas.microsoft.com/office/drawing/2014/main" id="{A0ADBA72-396B-45D0-94D0-3978BCDA47A2}"/>
+                <a16:creationId xmlns:a16="http://schemas.microsoft.com/office/drawing/2014/main" id="{7C3857BA-3EF1-49F5-A637-1A13E0BA0968}"/>
               </a:ext>
             </a:extLst>
           </p:cNvPr>
@@ -7606,43 +7559,73 @@
         </p:nvSpPr>
         <p:spPr/>
         <p:txBody>
-          <a:bodyPr/>
-          <a:lstStyle/>
-          <a:p>
-            <a:r>
-              <a:rPr lang="en-US" dirty="0"/>
-              <a:t>In the above examples, we changed our variable that controls the loop by one (e.g. count = count + </a:t>
-            </a:r>
-            <a:r>
-              <a:rPr lang="en-US" dirty="0">
-                <a:latin typeface="Arial" panose="020B0604020202020204" pitchFamily="34" charset="0"/>
-                <a:cs typeface="Arial" panose="020B0604020202020204" pitchFamily="34" charset="0"/>
-              </a:rPr>
-              <a:t>1</a:t>
-            </a:r>
-            <a:r>
-              <a:rPr lang="en-US" dirty="0"/>
-              <a:t>)</a:t>
-            </a:r>
-          </a:p>
-          <a:p>
-            <a:r>
-              <a:rPr lang="en-US" dirty="0"/>
-              <a:t>However, you can change that variable by any amount, including subtracting from it.</a:t>
-            </a:r>
-          </a:p>
-          <a:p>
-            <a:r>
-              <a:rPr lang="en-US" dirty="0"/>
-              <a:t>Recall “modulus.” Mod is the remainder when you divide 2 numbers. If the number divide evenly, then the mod of the 2 numbers (remainder) is 0.</a:t>
-            </a:r>
+          <a:bodyPr>
+            <a:normAutofit lnSpcReduction="10000"/>
+          </a:bodyPr>
+          <a:lstStyle/>
+          <a:p>
+            <a:r>
+              <a:rPr lang="en-US" dirty="0"/>
+              <a:t>Syntax: </a:t>
+            </a:r>
+          </a:p>
+          <a:p>
+            <a:pPr marL="0" indent="0">
+              <a:buNone/>
+            </a:pPr>
+            <a:r>
+              <a:rPr lang="en-US" dirty="0"/>
+              <a:t>	while &lt;condition&gt;:</a:t>
+            </a:r>
+          </a:p>
+          <a:p>
+            <a:pPr marL="0" indent="0">
+              <a:buNone/>
+            </a:pPr>
+            <a:r>
+              <a:rPr lang="en-US" dirty="0"/>
+              <a:t>	     statement1</a:t>
+            </a:r>
+          </a:p>
+          <a:p>
+            <a:pPr marL="0" indent="0">
+              <a:buNone/>
+            </a:pPr>
+            <a:r>
+              <a:rPr lang="en-US" dirty="0"/>
+              <a:t>	statement2</a:t>
+            </a:r>
+          </a:p>
+          <a:p>
+            <a:pPr lvl="1"/>
+            <a:r>
+              <a:rPr lang="en-US" dirty="0"/>
+              <a:t>Everything indented below the while is repeated every time we enter the loop (statement1 in the example above)</a:t>
+            </a:r>
+          </a:p>
+          <a:p>
+            <a:pPr lvl="1"/>
+            <a:r>
+              <a:rPr lang="en-US" dirty="0"/>
+              <a:t>Once you indent back to the left, the code is outside the while; it’s what happens once the while condition is false (statement2 in the example above)</a:t>
+            </a:r>
+          </a:p>
+          <a:p>
+            <a:pPr lvl="1"/>
+            <a:r>
+              <a:rPr lang="en-US" dirty="0"/>
+              <a:t>&lt;condition&gt; is a Boolean condition (evaluates to true or false)</a:t>
+            </a:r>
+          </a:p>
+          <a:p>
+            <a:endParaRPr lang="en-US" dirty="0"/>
           </a:p>
         </p:txBody>
       </p:sp>
     </p:spTree>
     <p:extLst>
       <p:ext uri="{BB962C8B-B14F-4D97-AF65-F5344CB8AC3E}">
-        <p14:creationId xmlns:p14="http://schemas.microsoft.com/office/powerpoint/2010/main" val="2025216280"/>
+        <p14:creationId xmlns:p14="http://schemas.microsoft.com/office/powerpoint/2010/main" val="515540744"/>
       </p:ext>
     </p:extLst>
   </p:cSld>
@@ -7674,145 +7657,6 @@
           <p:cNvPr id="2" name="Title 1">
             <a:extLst>
               <a:ext uri="{FF2B5EF4-FFF2-40B4-BE49-F238E27FC236}">
-                <a16:creationId xmlns:a16="http://schemas.microsoft.com/office/drawing/2014/main" id="{E6AA549E-CEB9-4612-84DC-E44A7C2C8AD1}"/>
-              </a:ext>
-            </a:extLst>
-          </p:cNvPr>
-          <p:cNvSpPr>
-            <a:spLocks noGrp="1"/>
-          </p:cNvSpPr>
-          <p:nvPr>
-            <p:ph type="title"/>
-          </p:nvPr>
-        </p:nvSpPr>
-        <p:spPr/>
-        <p:txBody>
-          <a:bodyPr/>
-          <a:lstStyle/>
-          <a:p>
-            <a:r>
-              <a:rPr lang="en-US" dirty="0"/>
-              <a:t>KEY POINTs</a:t>
-            </a:r>
-          </a:p>
-        </p:txBody>
-      </p:sp>
-      <p:sp>
-        <p:nvSpPr>
-          <p:cNvPr id="3" name="Content Placeholder 2">
-            <a:extLst>
-              <a:ext uri="{FF2B5EF4-FFF2-40B4-BE49-F238E27FC236}">
-                <a16:creationId xmlns:a16="http://schemas.microsoft.com/office/drawing/2014/main" id="{7C3857BA-3EF1-49F5-A637-1A13E0BA0968}"/>
-              </a:ext>
-            </a:extLst>
-          </p:cNvPr>
-          <p:cNvSpPr>
-            <a:spLocks noGrp="1"/>
-          </p:cNvSpPr>
-          <p:nvPr>
-            <p:ph idx="1"/>
-          </p:nvPr>
-        </p:nvSpPr>
-        <p:spPr/>
-        <p:txBody>
-          <a:bodyPr>
-            <a:normAutofit lnSpcReduction="10000"/>
-          </a:bodyPr>
-          <a:lstStyle/>
-          <a:p>
-            <a:r>
-              <a:rPr lang="en-US" dirty="0"/>
-              <a:t>Syntax: </a:t>
-            </a:r>
-          </a:p>
-          <a:p>
-            <a:pPr marL="0" indent="0">
-              <a:buNone/>
-            </a:pPr>
-            <a:r>
-              <a:rPr lang="en-US" dirty="0"/>
-              <a:t>	while &lt;condition&gt;:</a:t>
-            </a:r>
-          </a:p>
-          <a:p>
-            <a:pPr marL="0" indent="0">
-              <a:buNone/>
-            </a:pPr>
-            <a:r>
-              <a:rPr lang="en-US" dirty="0"/>
-              <a:t>	     statement1</a:t>
-            </a:r>
-          </a:p>
-          <a:p>
-            <a:pPr marL="0" indent="0">
-              <a:buNone/>
-            </a:pPr>
-            <a:r>
-              <a:rPr lang="en-US" dirty="0"/>
-              <a:t>	statement2</a:t>
-            </a:r>
-          </a:p>
-          <a:p>
-            <a:pPr lvl="1"/>
-            <a:r>
-              <a:rPr lang="en-US" dirty="0"/>
-              <a:t>Everything indented below the while is repeated every time we enter the loop (statement1 in the example above)</a:t>
-            </a:r>
-          </a:p>
-          <a:p>
-            <a:pPr lvl="1"/>
-            <a:r>
-              <a:rPr lang="en-US" dirty="0"/>
-              <a:t>Once you indent back to the left, the code is outside the while; it’s what happens once the while condition is false (statement2 in the example above)</a:t>
-            </a:r>
-          </a:p>
-          <a:p>
-            <a:pPr lvl="1"/>
-            <a:r>
-              <a:rPr lang="en-US" dirty="0"/>
-              <a:t>&lt;condition&gt; is a Boolean condition (evaluates to true or false)</a:t>
-            </a:r>
-          </a:p>
-          <a:p>
-            <a:endParaRPr lang="en-US" dirty="0"/>
-          </a:p>
-        </p:txBody>
-      </p:sp>
-    </p:spTree>
-    <p:extLst>
-      <p:ext uri="{BB962C8B-B14F-4D97-AF65-F5344CB8AC3E}">
-        <p14:creationId xmlns:p14="http://schemas.microsoft.com/office/powerpoint/2010/main" val="515540744"/>
-      </p:ext>
-    </p:extLst>
-  </p:cSld>
-  <p:clrMapOvr>
-    <a:masterClrMapping/>
-  </p:clrMapOvr>
-</p:sld>
-</file>
-
-<file path=ppt/slides/slide27.xml><?xml version="1.0" encoding="utf-8"?>
-<p:sld xmlns:a="http://schemas.openxmlformats.org/drawingml/2006/main" xmlns:r="http://schemas.openxmlformats.org/officeDocument/2006/relationships" xmlns:p="http://schemas.openxmlformats.org/presentationml/2006/main">
-  <p:cSld>
-    <p:spTree>
-      <p:nvGrpSpPr>
-        <p:cNvPr id="1" name=""/>
-        <p:cNvGrpSpPr/>
-        <p:nvPr/>
-      </p:nvGrpSpPr>
-      <p:grpSpPr>
-        <a:xfrm>
-          <a:off x="0" y="0"/>
-          <a:ext cx="0" cy="0"/>
-          <a:chOff x="0" y="0"/>
-          <a:chExt cx="0" cy="0"/>
-        </a:xfrm>
-      </p:grpSpPr>
-      <p:sp>
-        <p:nvSpPr>
-          <p:cNvPr id="2" name="Title 1">
-            <a:extLst>
-              <a:ext uri="{FF2B5EF4-FFF2-40B4-BE49-F238E27FC236}">
                 <a16:creationId xmlns:a16="http://schemas.microsoft.com/office/drawing/2014/main" id="{557F8143-063C-4B9A-B6A2-FAB6AF71A486}"/>
               </a:ext>
             </a:extLst>
@@ -7945,7 +7789,7 @@
 </p:sld>
 </file>
 
-<file path=ppt/slides/slide28.xml><?xml version="1.0" encoding="utf-8"?>
+<file path=ppt/slides/slide27.xml><?xml version="1.0" encoding="utf-8"?>
 <p:sld xmlns:a="http://schemas.openxmlformats.org/drawingml/2006/main" xmlns:r="http://schemas.openxmlformats.org/officeDocument/2006/relationships" xmlns:p="http://schemas.openxmlformats.org/presentationml/2006/main">
   <p:cSld>
     <p:spTree>

</xml_diff>